<commit_message>
how to run a R# script?
</commit_message>
<xml_diff>
--- a/docs/Figures.pptx
+++ b/docs/Figures.pptx
@@ -3174,425 +3174,440 @@
           </a:p>
         </p:txBody>
       </p:sp>
-      <p:sp>
-        <p:nvSpPr>
-          <p:cNvPr id="4" name="矩形 3"/>
-          <p:cNvSpPr/>
+      <p:grpSp>
+        <p:nvGrpSpPr>
+          <p:cNvPr id="15" name="组合 14"/>
+          <p:cNvGrpSpPr/>
           <p:nvPr/>
-        </p:nvSpPr>
-        <p:spPr>
+        </p:nvGrpSpPr>
+        <p:grpSpPr>
           <a:xfrm>
             <a:off x="487570" y="1756508"/>
-            <a:ext cx="4194673" cy="576064"/>
+            <a:ext cx="8085891" cy="4216977"/>
+            <a:chOff x="487570" y="1756508"/>
+            <a:chExt cx="8085891" cy="4216977"/>
           </a:xfrm>
-          <a:prstGeom prst="rect">
-            <a:avLst/>
-          </a:prstGeom>
-        </p:spPr>
-        <p:style>
-          <a:lnRef idx="1">
-            <a:schemeClr val="accent1"/>
-          </a:lnRef>
-          <a:fillRef idx="3">
-            <a:schemeClr val="accent1"/>
-          </a:fillRef>
-          <a:effectRef idx="2">
-            <a:schemeClr val="accent1"/>
-          </a:effectRef>
-          <a:fontRef idx="minor">
-            <a:schemeClr val="lt1"/>
-          </a:fontRef>
-        </p:style>
-        <p:txBody>
-          <a:bodyPr rtlCol="0" anchor="ctr"/>
-          <a:lstStyle/>
-          <a:p>
-            <a:pPr algn="ctr"/>
-            <a:r>
-              <a:rPr lang="en-US" altLang="zh-CN" dirty="0" smtClean="0"/>
-              <a:t>Global.envir()</a:t>
-            </a:r>
-            <a:endParaRPr lang="zh-CN" altLang="en-US" dirty="0"/>
-          </a:p>
-        </p:txBody>
-      </p:sp>
-      <p:sp>
-        <p:nvSpPr>
-          <p:cNvPr id="5" name="圆角矩形 4"/>
-          <p:cNvSpPr/>
-          <p:nvPr/>
-        </p:nvSpPr>
-        <p:spPr>
-          <a:xfrm>
-            <a:off x="2560793" y="3140968"/>
-            <a:ext cx="3960440" cy="432048"/>
-          </a:xfrm>
-          <a:prstGeom prst="roundRect">
-            <a:avLst/>
-          </a:prstGeom>
-        </p:spPr>
-        <p:style>
-          <a:lnRef idx="1">
-            <a:schemeClr val="accent5"/>
-          </a:lnRef>
-          <a:fillRef idx="3">
-            <a:schemeClr val="accent5"/>
-          </a:fillRef>
-          <a:effectRef idx="2">
-            <a:schemeClr val="accent5"/>
-          </a:effectRef>
-          <a:fontRef idx="minor">
-            <a:schemeClr val="lt1"/>
-          </a:fontRef>
-        </p:style>
-        <p:txBody>
-          <a:bodyPr rtlCol="0" anchor="ctr"/>
-          <a:lstStyle/>
-          <a:p>
-            <a:pPr algn="ctr"/>
-            <a:endParaRPr lang="zh-CN" altLang="en-US"/>
-          </a:p>
-        </p:txBody>
-      </p:sp>
-      <p:sp>
-        <p:nvSpPr>
-          <p:cNvPr id="6" name="TextBox 5"/>
-          <p:cNvSpPr txBox="1"/>
-          <p:nvPr/>
-        </p:nvSpPr>
-        <p:spPr>
-          <a:xfrm>
-            <a:off x="827584" y="3043123"/>
-            <a:ext cx="1537793" cy="646331"/>
-          </a:xfrm>
-          <a:prstGeom prst="rect">
-            <a:avLst/>
-          </a:prstGeom>
-          <a:noFill/>
-        </p:spPr>
-        <p:txBody>
-          <a:bodyPr wrap="none" rtlCol="0">
-            <a:spAutoFit/>
-          </a:bodyPr>
-          <a:lstStyle/>
-          <a:p>
-            <a:pPr algn="ctr"/>
-            <a:r>
-              <a:rPr lang="en-US" altLang="zh-CN" dirty="0" smtClean="0"/>
-              <a:t>R# script</a:t>
-            </a:r>
-          </a:p>
-          <a:p>
-            <a:pPr algn="ctr"/>
-            <a:r>
-              <a:rPr lang="en-US" altLang="zh-CN" dirty="0" smtClean="0"/>
-              <a:t>(Main closure)</a:t>
-            </a:r>
-            <a:endParaRPr lang="zh-CN" altLang="en-US" dirty="0"/>
-          </a:p>
-        </p:txBody>
-      </p:sp>
-      <p:sp>
-        <p:nvSpPr>
-          <p:cNvPr id="7" name="TextBox 6"/>
-          <p:cNvSpPr txBox="1"/>
-          <p:nvPr/>
-        </p:nvSpPr>
-        <p:spPr>
-          <a:xfrm>
-            <a:off x="4749705" y="2422195"/>
-            <a:ext cx="2646237" cy="369332"/>
-          </a:xfrm>
-          <a:prstGeom prst="rect">
-            <a:avLst/>
-          </a:prstGeom>
-          <a:noFill/>
-        </p:spPr>
-        <p:txBody>
-          <a:bodyPr wrap="none" rtlCol="0">
-            <a:spAutoFit/>
-          </a:bodyPr>
-          <a:lstStyle/>
-          <a:p>
-            <a:r>
-              <a:rPr lang="en-US" altLang="zh-CN" dirty="0" smtClean="0"/>
-              <a:t>source(filepath, args as ...)</a:t>
-            </a:r>
-            <a:endParaRPr lang="zh-CN" altLang="en-US" dirty="0"/>
-          </a:p>
-        </p:txBody>
-      </p:sp>
-      <p:sp>
-        <p:nvSpPr>
-          <p:cNvPr id="8" name="下箭头 7"/>
-          <p:cNvSpPr/>
-          <p:nvPr/>
-        </p:nvSpPr>
-        <p:spPr>
-          <a:xfrm>
-            <a:off x="2584906" y="2416241"/>
-            <a:ext cx="2097337" cy="626881"/>
-          </a:xfrm>
-          <a:prstGeom prst="downArrow">
-            <a:avLst>
-              <a:gd name="adj1" fmla="val 77792"/>
-              <a:gd name="adj2" fmla="val 32780"/>
-            </a:avLst>
-          </a:prstGeom>
-        </p:spPr>
-        <p:style>
-          <a:lnRef idx="1">
-            <a:schemeClr val="accent1"/>
-          </a:lnRef>
-          <a:fillRef idx="3">
-            <a:schemeClr val="accent1"/>
-          </a:fillRef>
-          <a:effectRef idx="2">
-            <a:schemeClr val="accent1"/>
-          </a:effectRef>
-          <a:fontRef idx="minor">
-            <a:schemeClr val="lt1"/>
-          </a:fontRef>
-        </p:style>
-        <p:txBody>
-          <a:bodyPr rtlCol="0" anchor="ctr"/>
-          <a:lstStyle/>
-          <a:p>
-            <a:pPr algn="ctr"/>
-            <a:r>
-              <a:rPr lang="en-US" altLang="zh-CN" dirty="0" smtClean="0"/>
-              <a:t>parent(global) + arguments</a:t>
-            </a:r>
-            <a:endParaRPr lang="zh-CN" altLang="en-US" dirty="0"/>
-          </a:p>
-        </p:txBody>
-      </p:sp>
-      <p:sp>
-        <p:nvSpPr>
-          <p:cNvPr id="9" name="圆角矩形 8"/>
-          <p:cNvSpPr/>
-          <p:nvPr/>
-        </p:nvSpPr>
-        <p:spPr>
-          <a:xfrm>
-            <a:off x="3267116" y="4293096"/>
-            <a:ext cx="4104456" cy="432048"/>
-          </a:xfrm>
-          <a:prstGeom prst="roundRect">
-            <a:avLst/>
-          </a:prstGeom>
-        </p:spPr>
-        <p:style>
-          <a:lnRef idx="1">
-            <a:schemeClr val="accent1"/>
-          </a:lnRef>
-          <a:fillRef idx="3">
-            <a:schemeClr val="accent1"/>
-          </a:fillRef>
-          <a:effectRef idx="2">
-            <a:schemeClr val="accent1"/>
-          </a:effectRef>
-          <a:fontRef idx="minor">
-            <a:schemeClr val="lt1"/>
-          </a:fontRef>
-        </p:style>
-        <p:txBody>
-          <a:bodyPr rtlCol="0" anchor="ctr"/>
-          <a:lstStyle/>
-          <a:p>
-            <a:pPr algn="ctr"/>
-            <a:endParaRPr lang="zh-CN" altLang="en-US"/>
-          </a:p>
-        </p:txBody>
-      </p:sp>
-      <p:sp>
-        <p:nvSpPr>
-          <p:cNvPr id="10" name="TextBox 9"/>
-          <p:cNvSpPr txBox="1"/>
-          <p:nvPr/>
-        </p:nvSpPr>
-        <p:spPr>
-          <a:xfrm>
-            <a:off x="827584" y="4324454"/>
-            <a:ext cx="1902316" cy="369332"/>
-          </a:xfrm>
-          <a:prstGeom prst="rect">
-            <a:avLst/>
-          </a:prstGeom>
-          <a:noFill/>
-        </p:spPr>
-        <p:txBody>
-          <a:bodyPr wrap="none" rtlCol="0">
-            <a:spAutoFit/>
-          </a:bodyPr>
-          <a:lstStyle/>
-          <a:p>
-            <a:r>
-              <a:rPr lang="en-US" altLang="zh-CN" dirty="0" smtClean="0"/>
-              <a:t>function/closure 1</a:t>
-            </a:r>
-            <a:endParaRPr lang="zh-CN" altLang="en-US" dirty="0"/>
-          </a:p>
-        </p:txBody>
-      </p:sp>
-      <p:sp>
-        <p:nvSpPr>
-          <p:cNvPr id="11" name="下箭头 10"/>
-          <p:cNvSpPr/>
-          <p:nvPr/>
-        </p:nvSpPr>
-        <p:spPr>
-          <a:xfrm>
-            <a:off x="3286814" y="3621794"/>
-            <a:ext cx="3234419" cy="590002"/>
-          </a:xfrm>
-          <a:prstGeom prst="downArrow">
-            <a:avLst>
-              <a:gd name="adj1" fmla="val 77792"/>
-              <a:gd name="adj2" fmla="val 32780"/>
-            </a:avLst>
-          </a:prstGeom>
-        </p:spPr>
-        <p:style>
-          <a:lnRef idx="1">
-            <a:schemeClr val="accent1"/>
-          </a:lnRef>
-          <a:fillRef idx="3">
-            <a:schemeClr val="accent1"/>
-          </a:fillRef>
-          <a:effectRef idx="2">
-            <a:schemeClr val="accent1"/>
-          </a:effectRef>
-          <a:fontRef idx="minor">
-            <a:schemeClr val="lt1"/>
-          </a:fontRef>
-        </p:style>
-        <p:txBody>
-          <a:bodyPr rtlCol="0" anchor="ctr"/>
-          <a:lstStyle/>
-          <a:p>
-            <a:pPr algn="ctr"/>
-            <a:r>
-              <a:rPr lang="en-US" altLang="zh-CN" dirty="0" smtClean="0"/>
-              <a:t>parent(main) + parameters</a:t>
-            </a:r>
-            <a:endParaRPr lang="zh-CN" altLang="en-US" dirty="0"/>
-          </a:p>
-        </p:txBody>
-      </p:sp>
-      <p:sp>
-        <p:nvSpPr>
-          <p:cNvPr id="12" name="圆角矩形 11"/>
-          <p:cNvSpPr/>
-          <p:nvPr/>
-        </p:nvSpPr>
-        <p:spPr>
-          <a:xfrm>
-            <a:off x="4469005" y="5541437"/>
-            <a:ext cx="4104456" cy="432048"/>
-          </a:xfrm>
-          <a:prstGeom prst="roundRect">
-            <a:avLst/>
-          </a:prstGeom>
-        </p:spPr>
-        <p:style>
-          <a:lnRef idx="1">
-            <a:schemeClr val="accent1"/>
-          </a:lnRef>
-          <a:fillRef idx="3">
-            <a:schemeClr val="accent1"/>
-          </a:fillRef>
-          <a:effectRef idx="2">
-            <a:schemeClr val="accent1"/>
-          </a:effectRef>
-          <a:fontRef idx="minor">
-            <a:schemeClr val="lt1"/>
-          </a:fontRef>
-        </p:style>
-        <p:txBody>
-          <a:bodyPr rtlCol="0" anchor="ctr"/>
-          <a:lstStyle/>
-          <a:p>
-            <a:pPr algn="ctr"/>
-            <a:endParaRPr lang="zh-CN" altLang="en-US"/>
-          </a:p>
-        </p:txBody>
-      </p:sp>
-      <p:sp>
-        <p:nvSpPr>
-          <p:cNvPr id="13" name="TextBox 12"/>
-          <p:cNvSpPr txBox="1"/>
-          <p:nvPr/>
-        </p:nvSpPr>
-        <p:spPr>
-          <a:xfrm>
-            <a:off x="827584" y="5572795"/>
-            <a:ext cx="1902316" cy="369332"/>
-          </a:xfrm>
-          <a:prstGeom prst="rect">
-            <a:avLst/>
-          </a:prstGeom>
-          <a:noFill/>
-        </p:spPr>
-        <p:txBody>
-          <a:bodyPr wrap="none" rtlCol="0">
-            <a:spAutoFit/>
-          </a:bodyPr>
-          <a:lstStyle/>
-          <a:p>
-            <a:r>
-              <a:rPr lang="en-US" altLang="zh-CN" dirty="0" smtClean="0"/>
-              <a:t>function/closure 2</a:t>
-            </a:r>
-            <a:endParaRPr lang="zh-CN" altLang="en-US" dirty="0"/>
-          </a:p>
-        </p:txBody>
-      </p:sp>
-      <p:sp>
-        <p:nvSpPr>
-          <p:cNvPr id="14" name="下箭头 13"/>
-          <p:cNvSpPr/>
-          <p:nvPr/>
-        </p:nvSpPr>
-        <p:spPr>
-          <a:xfrm>
-            <a:off x="4488703" y="4870135"/>
-            <a:ext cx="3234419" cy="590002"/>
-          </a:xfrm>
-          <a:prstGeom prst="downArrow">
-            <a:avLst>
-              <a:gd name="adj1" fmla="val 77792"/>
-              <a:gd name="adj2" fmla="val 32780"/>
-            </a:avLst>
-          </a:prstGeom>
-        </p:spPr>
-        <p:style>
-          <a:lnRef idx="1">
-            <a:schemeClr val="accent1"/>
-          </a:lnRef>
-          <a:fillRef idx="3">
-            <a:schemeClr val="accent1"/>
-          </a:fillRef>
-          <a:effectRef idx="2">
-            <a:schemeClr val="accent1"/>
-          </a:effectRef>
-          <a:fontRef idx="minor">
-            <a:schemeClr val="lt1"/>
-          </a:fontRef>
-        </p:style>
-        <p:txBody>
-          <a:bodyPr rtlCol="0" anchor="ctr"/>
-          <a:lstStyle/>
-          <a:p>
-            <a:pPr algn="ctr"/>
-            <a:r>
-              <a:rPr lang="en-US" altLang="zh-CN" dirty="0" smtClean="0"/>
-              <a:t>parent(function) + parameters</a:t>
-            </a:r>
-            <a:endParaRPr lang="zh-CN" altLang="en-US" dirty="0"/>
-          </a:p>
-        </p:txBody>
-      </p:sp>
+        </p:grpSpPr>
+        <p:sp>
+          <p:nvSpPr>
+            <p:cNvPr id="4" name="矩形 3"/>
+            <p:cNvSpPr/>
+            <p:nvPr/>
+          </p:nvSpPr>
+          <p:spPr>
+            <a:xfrm>
+              <a:off x="487570" y="1756508"/>
+              <a:ext cx="4194673" cy="576064"/>
+            </a:xfrm>
+            <a:prstGeom prst="rect">
+              <a:avLst/>
+            </a:prstGeom>
+          </p:spPr>
+          <p:style>
+            <a:lnRef idx="1">
+              <a:schemeClr val="accent1"/>
+            </a:lnRef>
+            <a:fillRef idx="3">
+              <a:schemeClr val="accent1"/>
+            </a:fillRef>
+            <a:effectRef idx="2">
+              <a:schemeClr val="accent1"/>
+            </a:effectRef>
+            <a:fontRef idx="minor">
+              <a:schemeClr val="lt1"/>
+            </a:fontRef>
+          </p:style>
+          <p:txBody>
+            <a:bodyPr rtlCol="0" anchor="ctr"/>
+            <a:lstStyle/>
+            <a:p>
+              <a:pPr algn="ctr"/>
+              <a:r>
+                <a:rPr lang="en-US" altLang="zh-CN" dirty="0" smtClean="0"/>
+                <a:t>Global.envir()</a:t>
+              </a:r>
+              <a:endParaRPr lang="zh-CN" altLang="en-US" dirty="0"/>
+            </a:p>
+          </p:txBody>
+        </p:sp>
+        <p:sp>
+          <p:nvSpPr>
+            <p:cNvPr id="5" name="圆角矩形 4"/>
+            <p:cNvSpPr/>
+            <p:nvPr/>
+          </p:nvSpPr>
+          <p:spPr>
+            <a:xfrm>
+              <a:off x="2560793" y="3140968"/>
+              <a:ext cx="3960440" cy="432048"/>
+            </a:xfrm>
+            <a:prstGeom prst="roundRect">
+              <a:avLst/>
+            </a:prstGeom>
+          </p:spPr>
+          <p:style>
+            <a:lnRef idx="1">
+              <a:schemeClr val="accent5"/>
+            </a:lnRef>
+            <a:fillRef idx="3">
+              <a:schemeClr val="accent5"/>
+            </a:fillRef>
+            <a:effectRef idx="2">
+              <a:schemeClr val="accent5"/>
+            </a:effectRef>
+            <a:fontRef idx="minor">
+              <a:schemeClr val="lt1"/>
+            </a:fontRef>
+          </p:style>
+          <p:txBody>
+            <a:bodyPr rtlCol="0" anchor="ctr"/>
+            <a:lstStyle/>
+            <a:p>
+              <a:pPr algn="ctr"/>
+              <a:endParaRPr lang="zh-CN" altLang="en-US"/>
+            </a:p>
+          </p:txBody>
+        </p:sp>
+        <p:sp>
+          <p:nvSpPr>
+            <p:cNvPr id="6" name="TextBox 5"/>
+            <p:cNvSpPr txBox="1"/>
+            <p:nvPr/>
+          </p:nvSpPr>
+          <p:spPr>
+            <a:xfrm>
+              <a:off x="827584" y="3043123"/>
+              <a:ext cx="1537793" cy="646331"/>
+            </a:xfrm>
+            <a:prstGeom prst="rect">
+              <a:avLst/>
+            </a:prstGeom>
+            <a:noFill/>
+          </p:spPr>
+          <p:txBody>
+            <a:bodyPr wrap="none" rtlCol="0">
+              <a:spAutoFit/>
+            </a:bodyPr>
+            <a:lstStyle/>
+            <a:p>
+              <a:pPr algn="ctr"/>
+              <a:r>
+                <a:rPr lang="en-US" altLang="zh-CN" dirty="0" smtClean="0"/>
+                <a:t>R# script</a:t>
+              </a:r>
+            </a:p>
+            <a:p>
+              <a:pPr algn="ctr"/>
+              <a:r>
+                <a:rPr lang="en-US" altLang="zh-CN" dirty="0" smtClean="0"/>
+                <a:t>(Main closure)</a:t>
+              </a:r>
+              <a:endParaRPr lang="zh-CN" altLang="en-US" dirty="0"/>
+            </a:p>
+          </p:txBody>
+        </p:sp>
+        <p:sp>
+          <p:nvSpPr>
+            <p:cNvPr id="7" name="TextBox 6"/>
+            <p:cNvSpPr txBox="1"/>
+            <p:nvPr/>
+          </p:nvSpPr>
+          <p:spPr>
+            <a:xfrm>
+              <a:off x="4749705" y="2422195"/>
+              <a:ext cx="2646237" cy="369332"/>
+            </a:xfrm>
+            <a:prstGeom prst="rect">
+              <a:avLst/>
+            </a:prstGeom>
+            <a:noFill/>
+          </p:spPr>
+          <p:txBody>
+            <a:bodyPr wrap="none" rtlCol="0">
+              <a:spAutoFit/>
+            </a:bodyPr>
+            <a:lstStyle/>
+            <a:p>
+              <a:r>
+                <a:rPr lang="en-US" altLang="zh-CN" dirty="0" smtClean="0"/>
+                <a:t>source(filepath, args as ...)</a:t>
+              </a:r>
+              <a:endParaRPr lang="zh-CN" altLang="en-US" dirty="0"/>
+            </a:p>
+          </p:txBody>
+        </p:sp>
+        <p:sp>
+          <p:nvSpPr>
+            <p:cNvPr id="8" name="下箭头 7"/>
+            <p:cNvSpPr/>
+            <p:nvPr/>
+          </p:nvSpPr>
+          <p:spPr>
+            <a:xfrm>
+              <a:off x="2584906" y="2416241"/>
+              <a:ext cx="2097337" cy="626881"/>
+            </a:xfrm>
+            <a:prstGeom prst="downArrow">
+              <a:avLst>
+                <a:gd name="adj1" fmla="val 77792"/>
+                <a:gd name="adj2" fmla="val 32780"/>
+              </a:avLst>
+            </a:prstGeom>
+          </p:spPr>
+          <p:style>
+            <a:lnRef idx="1">
+              <a:schemeClr val="accent1"/>
+            </a:lnRef>
+            <a:fillRef idx="3">
+              <a:schemeClr val="accent1"/>
+            </a:fillRef>
+            <a:effectRef idx="2">
+              <a:schemeClr val="accent1"/>
+            </a:effectRef>
+            <a:fontRef idx="minor">
+              <a:schemeClr val="lt1"/>
+            </a:fontRef>
+          </p:style>
+          <p:txBody>
+            <a:bodyPr rtlCol="0" anchor="ctr"/>
+            <a:lstStyle/>
+            <a:p>
+              <a:pPr algn="ctr"/>
+              <a:r>
+                <a:rPr lang="en-US" altLang="zh-CN" dirty="0" smtClean="0"/>
+                <a:t>parent(global) + arguments</a:t>
+              </a:r>
+              <a:endParaRPr lang="zh-CN" altLang="en-US" dirty="0"/>
+            </a:p>
+          </p:txBody>
+        </p:sp>
+        <p:sp>
+          <p:nvSpPr>
+            <p:cNvPr id="9" name="圆角矩形 8"/>
+            <p:cNvSpPr/>
+            <p:nvPr/>
+          </p:nvSpPr>
+          <p:spPr>
+            <a:xfrm>
+              <a:off x="3267116" y="4293096"/>
+              <a:ext cx="4104456" cy="432048"/>
+            </a:xfrm>
+            <a:prstGeom prst="roundRect">
+              <a:avLst/>
+            </a:prstGeom>
+          </p:spPr>
+          <p:style>
+            <a:lnRef idx="1">
+              <a:schemeClr val="accent1"/>
+            </a:lnRef>
+            <a:fillRef idx="3">
+              <a:schemeClr val="accent1"/>
+            </a:fillRef>
+            <a:effectRef idx="2">
+              <a:schemeClr val="accent1"/>
+            </a:effectRef>
+            <a:fontRef idx="minor">
+              <a:schemeClr val="lt1"/>
+            </a:fontRef>
+          </p:style>
+          <p:txBody>
+            <a:bodyPr rtlCol="0" anchor="ctr"/>
+            <a:lstStyle/>
+            <a:p>
+              <a:pPr algn="ctr"/>
+              <a:endParaRPr lang="zh-CN" altLang="en-US"/>
+            </a:p>
+          </p:txBody>
+        </p:sp>
+        <p:sp>
+          <p:nvSpPr>
+            <p:cNvPr id="10" name="TextBox 9"/>
+            <p:cNvSpPr txBox="1"/>
+            <p:nvPr/>
+          </p:nvSpPr>
+          <p:spPr>
+            <a:xfrm>
+              <a:off x="827584" y="4324454"/>
+              <a:ext cx="1902316" cy="369332"/>
+            </a:xfrm>
+            <a:prstGeom prst="rect">
+              <a:avLst/>
+            </a:prstGeom>
+            <a:noFill/>
+          </p:spPr>
+          <p:txBody>
+            <a:bodyPr wrap="none" rtlCol="0">
+              <a:spAutoFit/>
+            </a:bodyPr>
+            <a:lstStyle/>
+            <a:p>
+              <a:r>
+                <a:rPr lang="en-US" altLang="zh-CN" dirty="0" smtClean="0"/>
+                <a:t>function/closure 1</a:t>
+              </a:r>
+              <a:endParaRPr lang="zh-CN" altLang="en-US" dirty="0"/>
+            </a:p>
+          </p:txBody>
+        </p:sp>
+        <p:sp>
+          <p:nvSpPr>
+            <p:cNvPr id="11" name="下箭头 10"/>
+            <p:cNvSpPr/>
+            <p:nvPr/>
+          </p:nvSpPr>
+          <p:spPr>
+            <a:xfrm>
+              <a:off x="3286814" y="3621794"/>
+              <a:ext cx="3234419" cy="590002"/>
+            </a:xfrm>
+            <a:prstGeom prst="downArrow">
+              <a:avLst>
+                <a:gd name="adj1" fmla="val 77792"/>
+                <a:gd name="adj2" fmla="val 32780"/>
+              </a:avLst>
+            </a:prstGeom>
+          </p:spPr>
+          <p:style>
+            <a:lnRef idx="1">
+              <a:schemeClr val="accent1"/>
+            </a:lnRef>
+            <a:fillRef idx="3">
+              <a:schemeClr val="accent1"/>
+            </a:fillRef>
+            <a:effectRef idx="2">
+              <a:schemeClr val="accent1"/>
+            </a:effectRef>
+            <a:fontRef idx="minor">
+              <a:schemeClr val="lt1"/>
+            </a:fontRef>
+          </p:style>
+          <p:txBody>
+            <a:bodyPr rtlCol="0" anchor="ctr"/>
+            <a:lstStyle/>
+            <a:p>
+              <a:pPr algn="ctr"/>
+              <a:r>
+                <a:rPr lang="en-US" altLang="zh-CN" dirty="0" smtClean="0"/>
+                <a:t>parent(main) + parameters</a:t>
+              </a:r>
+              <a:endParaRPr lang="zh-CN" altLang="en-US" dirty="0"/>
+            </a:p>
+          </p:txBody>
+        </p:sp>
+        <p:sp>
+          <p:nvSpPr>
+            <p:cNvPr id="12" name="圆角矩形 11"/>
+            <p:cNvSpPr/>
+            <p:nvPr/>
+          </p:nvSpPr>
+          <p:spPr>
+            <a:xfrm>
+              <a:off x="4469005" y="5541437"/>
+              <a:ext cx="4104456" cy="432048"/>
+            </a:xfrm>
+            <a:prstGeom prst="roundRect">
+              <a:avLst/>
+            </a:prstGeom>
+          </p:spPr>
+          <p:style>
+            <a:lnRef idx="1">
+              <a:schemeClr val="accent1"/>
+            </a:lnRef>
+            <a:fillRef idx="3">
+              <a:schemeClr val="accent1"/>
+            </a:fillRef>
+            <a:effectRef idx="2">
+              <a:schemeClr val="accent1"/>
+            </a:effectRef>
+            <a:fontRef idx="minor">
+              <a:schemeClr val="lt1"/>
+            </a:fontRef>
+          </p:style>
+          <p:txBody>
+            <a:bodyPr rtlCol="0" anchor="ctr"/>
+            <a:lstStyle/>
+            <a:p>
+              <a:pPr algn="ctr"/>
+              <a:endParaRPr lang="zh-CN" altLang="en-US"/>
+            </a:p>
+          </p:txBody>
+        </p:sp>
+        <p:sp>
+          <p:nvSpPr>
+            <p:cNvPr id="13" name="TextBox 12"/>
+            <p:cNvSpPr txBox="1"/>
+            <p:nvPr/>
+          </p:nvSpPr>
+          <p:spPr>
+            <a:xfrm>
+              <a:off x="827584" y="5572795"/>
+              <a:ext cx="1902316" cy="369332"/>
+            </a:xfrm>
+            <a:prstGeom prst="rect">
+              <a:avLst/>
+            </a:prstGeom>
+            <a:noFill/>
+          </p:spPr>
+          <p:txBody>
+            <a:bodyPr wrap="none" rtlCol="0">
+              <a:spAutoFit/>
+            </a:bodyPr>
+            <a:lstStyle/>
+            <a:p>
+              <a:r>
+                <a:rPr lang="en-US" altLang="zh-CN" dirty="0" smtClean="0"/>
+                <a:t>function/closure 2</a:t>
+              </a:r>
+              <a:endParaRPr lang="zh-CN" altLang="en-US" dirty="0"/>
+            </a:p>
+          </p:txBody>
+        </p:sp>
+        <p:sp>
+          <p:nvSpPr>
+            <p:cNvPr id="14" name="下箭头 13"/>
+            <p:cNvSpPr/>
+            <p:nvPr/>
+          </p:nvSpPr>
+          <p:spPr>
+            <a:xfrm>
+              <a:off x="4488703" y="4870135"/>
+              <a:ext cx="3234419" cy="590002"/>
+            </a:xfrm>
+            <a:prstGeom prst="downArrow">
+              <a:avLst>
+                <a:gd name="adj1" fmla="val 77792"/>
+                <a:gd name="adj2" fmla="val 32780"/>
+              </a:avLst>
+            </a:prstGeom>
+          </p:spPr>
+          <p:style>
+            <a:lnRef idx="1">
+              <a:schemeClr val="accent1"/>
+            </a:lnRef>
+            <a:fillRef idx="3">
+              <a:schemeClr val="accent1"/>
+            </a:fillRef>
+            <a:effectRef idx="2">
+              <a:schemeClr val="accent1"/>
+            </a:effectRef>
+            <a:fontRef idx="minor">
+              <a:schemeClr val="lt1"/>
+            </a:fontRef>
+          </p:style>
+          <p:txBody>
+            <a:bodyPr rtlCol="0" anchor="ctr"/>
+            <a:lstStyle/>
+            <a:p>
+              <a:pPr algn="ctr"/>
+              <a:r>
+                <a:rPr lang="en-US" altLang="zh-CN" dirty="0" smtClean="0"/>
+                <a:t>parent(function) + parameters</a:t>
+              </a:r>
+              <a:endParaRPr lang="zh-CN" altLang="en-US" dirty="0"/>
+            </a:p>
+          </p:txBody>
+        </p:sp>
+      </p:grpSp>
     </p:spTree>
     <p:extLst>
       <p:ext uri="{BB962C8B-B14F-4D97-AF65-F5344CB8AC3E}">

</xml_diff>